<commit_message>
Updated power point presentation.
</commit_message>
<xml_diff>
--- a/doc/MUS2_GestureSpeechHue_Grebe_Winkler.pptx
+++ b/doc/MUS2_GestureSpeechHue_Grebe_Winkler.pptx
@@ -9505,25 +9505,7 @@
                   </a:innerShdw>
                 </a:effectLst>
               </a:rPr>
-              <a:t> Speech </a:t>
-            </a:r>
-            <a:r>
-              <a:rPr lang="de-DE" spc="0" dirty="0" smtClean="0">
-                <a:ln w="1905"/>
-                <a:solidFill>
-                  <a:schemeClr val="tx1">
-                    <a:lumMod val="95000"/>
-                  </a:schemeClr>
-                </a:solidFill>
-                <a:effectLst>
-                  <a:innerShdw blurRad="69850" dist="43180" dir="5400000">
-                    <a:srgbClr val="000000">
-                      <a:alpha val="65000"/>
-                    </a:srgbClr>
-                  </a:innerShdw>
-                </a:effectLst>
-              </a:rPr>
-              <a:t>Control </a:t>
+              <a:t> Speech Control </a:t>
             </a:r>
             <a:r>
               <a:rPr lang="de-DE" spc="0" dirty="0" err="1" smtClean="0">
@@ -9812,7 +9794,15 @@
             </a:pPr>
             <a:r>
               <a:rPr lang="de-DE" dirty="0" smtClean="0"/>
-              <a:t>Kinect (Xbox Version) funktioniert nicht in einer VM</a:t>
+              <a:t>Kinect (</a:t>
+            </a:r>
+            <a:r>
+              <a:rPr lang="de-DE" dirty="0" smtClean="0"/>
+              <a:t>Xbox-Version</a:t>
+            </a:r>
+            <a:r>
+              <a:rPr lang="de-DE" dirty="0" smtClean="0"/>
+              <a:t>) funktioniert nicht in einer VM</a:t>
             </a:r>
           </a:p>
           <a:p>
@@ -9856,8 +9846,16 @@
               <a:t>Hue</a:t>
             </a:r>
             <a:r>
+              <a:rPr lang="de-DE" dirty="0"/>
+              <a:t>-</a:t>
+            </a:r>
+            <a:r>
               <a:rPr lang="de-DE" dirty="0" smtClean="0"/>
-              <a:t> Bridge benötigt eine LAN-Verbindung</a:t>
+              <a:t>Bridge </a:t>
+            </a:r>
+            <a:r>
+              <a:rPr lang="de-DE" dirty="0" smtClean="0"/>
+              <a:t>benötigt eine LAN-Verbindung</a:t>
             </a:r>
             <a:endParaRPr lang="de-AT" dirty="0"/>
           </a:p>
@@ -9986,7 +9984,15 @@
             </a:r>
             <a:r>
               <a:rPr lang="de-AT" dirty="0" smtClean="0"/>
-              <a:t> Systems (drahtloses Lichtsystem)  </a:t>
+              <a:t> </a:t>
+            </a:r>
+            <a:r>
+              <a:rPr lang="de-AT" dirty="0" smtClean="0"/>
+              <a:t>Systems </a:t>
+            </a:r>
+            <a:r>
+              <a:rPr lang="de-AT" dirty="0" smtClean="0"/>
+              <a:t>(drahtloses Lichtsystem)  </a:t>
             </a:r>
             <a:r>
               <a:rPr lang="de-AT" dirty="0"/>
@@ -10024,8 +10030,13 @@
             </a:pPr>
             <a:r>
               <a:rPr lang="de-AT" dirty="0" smtClean="0"/>
-              <a:t>Gestenerkennung erfolgt über Kinect</a:t>
-            </a:r>
+              <a:t>Gestenerkennung </a:t>
+            </a:r>
+            <a:r>
+              <a:rPr lang="de-AT" dirty="0" smtClean="0"/>
+              <a:t>über Microsoft Kinect</a:t>
+            </a:r>
+            <a:endParaRPr lang="de-AT" dirty="0" smtClean="0"/>
           </a:p>
           <a:p>
             <a:pPr>
@@ -10035,7 +10046,11 @@
             </a:pPr>
             <a:r>
               <a:rPr lang="de-DE" dirty="0" smtClean="0"/>
-              <a:t>Spracherkennung über Mikrofon</a:t>
+              <a:t>Spracherkennung über </a:t>
+            </a:r>
+            <a:r>
+              <a:rPr lang="de-DE" dirty="0" smtClean="0"/>
+              <a:t>Microsoft Speech API (SAPI)</a:t>
             </a:r>
             <a:endParaRPr lang="de-AT" dirty="0"/>
           </a:p>
@@ -11248,7 +11263,7 @@
             <p:ph idx="1"/>
             <p:extLst>
               <p:ext uri="{D42A27DB-BD31-4B8C-83A1-F6EECF244321}">
-                <p14:modId xmlns:p14="http://schemas.microsoft.com/office/powerpoint/2010/main" val="2787378108"/>
+                <p14:modId xmlns:p14="http://schemas.microsoft.com/office/powerpoint/2010/main" val="3427992986"/>
               </p:ext>
             </p:extLst>
           </p:nvPr>
@@ -11509,7 +11524,35 @@
                           <a:ea typeface="+mn-ea"/>
                           <a:cs typeface="+mn-cs"/>
                         </a:rPr>
-                        <a:t>Alarm ein/ausschalten</a:t>
+                        <a:t>Alarm </a:t>
+                      </a:r>
+                      <a:r>
+                        <a:rPr lang="de-DE" sz="1600" b="0" kern="1200" dirty="0" smtClean="0">
+                          <a:solidFill>
+                            <a:schemeClr val="tx1">
+                              <a:lumMod val="95000"/>
+                            </a:schemeClr>
+                          </a:solidFill>
+                          <a:effectLst/>
+                          <a:latin typeface="+mn-lt"/>
+                          <a:ea typeface="+mn-ea"/>
+                          <a:cs typeface="+mn-cs"/>
+                        </a:rPr>
+                        <a:t>ein-/</a:t>
+                      </a:r>
+                      <a:r>
+                        <a:rPr lang="de-DE" sz="1600" b="0" kern="1200" dirty="0" smtClean="0">
+                          <a:solidFill>
+                            <a:schemeClr val="tx1">
+                              <a:lumMod val="95000"/>
+                            </a:schemeClr>
+                          </a:solidFill>
+                          <a:effectLst/>
+                          <a:latin typeface="+mn-lt"/>
+                          <a:ea typeface="+mn-ea"/>
+                          <a:cs typeface="+mn-cs"/>
+                        </a:rPr>
+                        <a:t>ausschalten</a:t>
                       </a:r>
                       <a:endParaRPr lang="de-AT" sz="1600" b="0" kern="1200" dirty="0">
                         <a:solidFill>
@@ -11951,7 +11994,21 @@
                           <a:ea typeface="+mn-ea"/>
                           <a:cs typeface="+mn-cs"/>
                         </a:rPr>
-                        <a:t> Light (Lauflicht)</a:t>
+                        <a:t> Light (Lauflicht</a:t>
+                      </a:r>
+                      <a:r>
+                        <a:rPr lang="de-AT" sz="1600" b="0" kern="1200" dirty="0" smtClean="0">
+                          <a:solidFill>
+                            <a:schemeClr val="tx1">
+                              <a:lumMod val="95000"/>
+                            </a:schemeClr>
+                          </a:solidFill>
+                          <a:effectLst/>
+                          <a:latin typeface="+mn-lt"/>
+                          <a:ea typeface="+mn-ea"/>
+                          <a:cs typeface="+mn-cs"/>
+                        </a:rPr>
+                        <a:t>) ein-/ausschalten</a:t>
                       </a:r>
                       <a:endParaRPr lang="de-AT" sz="1600" b="0" kern="1200" dirty="0">
                         <a:solidFill>
@@ -12021,7 +12078,7 @@
           <p:nvPr>
             <p:extLst>
               <p:ext uri="{D42A27DB-BD31-4B8C-83A1-F6EECF244321}">
-                <p14:modId xmlns:p14="http://schemas.microsoft.com/office/powerpoint/2010/main" val="3203686153"/>
+                <p14:modId xmlns:p14="http://schemas.microsoft.com/office/powerpoint/2010/main" val="2331870415"/>
               </p:ext>
             </p:extLst>
           </p:nvPr>
@@ -12059,7 +12116,35 @@
                           <a:ea typeface="+mn-ea"/>
                           <a:cs typeface="+mn-cs"/>
                         </a:rPr>
-                        <a:t>“Lamp one / two / three”  </a:t>
+                        <a:t>lamp </a:t>
+                      </a:r>
+                      <a:r>
+                        <a:rPr lang="en-US" sz="1600" b="0" kern="1200" dirty="0" smtClean="0">
+                          <a:solidFill>
+                            <a:schemeClr val="tx1">
+                              <a:lumMod val="95000"/>
+                            </a:schemeClr>
+                          </a:solidFill>
+                          <a:effectLst/>
+                          <a:latin typeface="+mn-lt"/>
+                          <a:ea typeface="+mn-ea"/>
+                          <a:cs typeface="+mn-cs"/>
+                        </a:rPr>
+                        <a:t>one / two / </a:t>
+                      </a:r>
+                      <a:r>
+                        <a:rPr lang="en-US" sz="1600" b="0" kern="1200" dirty="0" smtClean="0">
+                          <a:solidFill>
+                            <a:schemeClr val="tx1">
+                              <a:lumMod val="95000"/>
+                            </a:schemeClr>
+                          </a:solidFill>
+                          <a:effectLst/>
+                          <a:latin typeface="+mn-lt"/>
+                          <a:ea typeface="+mn-ea"/>
+                          <a:cs typeface="+mn-cs"/>
+                        </a:rPr>
+                        <a:t>three</a:t>
                       </a:r>
                       <a:endParaRPr lang="de-AT" sz="1600" b="0" kern="1200" dirty="0">
                         <a:solidFill>
@@ -12133,7 +12218,21 @@
                           <a:ea typeface="+mn-ea"/>
                           <a:cs typeface="+mn-cs"/>
                         </a:rPr>
-                        <a:t>Setzt die jeweilige Lampe auf rot</a:t>
+                        <a:t>Setzt die jeweilige Lampe auf </a:t>
+                      </a:r>
+                      <a:r>
+                        <a:rPr lang="de-AT" sz="1600" b="0" kern="1200" dirty="0" smtClean="0">
+                          <a:solidFill>
+                            <a:schemeClr val="tx1">
+                              <a:lumMod val="95000"/>
+                            </a:schemeClr>
+                          </a:solidFill>
+                          <a:effectLst/>
+                          <a:latin typeface="+mn-lt"/>
+                          <a:ea typeface="+mn-ea"/>
+                          <a:cs typeface="+mn-cs"/>
+                        </a:rPr>
+                        <a:t>Rot</a:t>
                       </a:r>
                       <a:endParaRPr lang="de-AT" sz="1600" b="0" kern="1200" dirty="0">
                         <a:solidFill>
@@ -12225,7 +12324,7 @@
                           <a:ea typeface="+mn-ea"/>
                           <a:cs typeface="+mn-cs"/>
                         </a:rPr>
-                        <a:t>“on</a:t>
+                        <a:t>on</a:t>
                       </a:r>
                       <a:r>
                         <a:rPr lang="en-US" sz="1600" b="0" kern="1200" baseline="0" dirty="0" smtClean="0">
@@ -12239,10 +12338,10 @@
                           <a:ea typeface="+mn-ea"/>
                           <a:cs typeface="+mn-cs"/>
                         </a:rPr>
-                        <a:t> / off</a:t>
+                        <a:t> </a:t>
                       </a:r>
                       <a:r>
-                        <a:rPr lang="en-US" sz="1600" b="0" kern="1200" dirty="0" smtClean="0">
+                        <a:rPr lang="en-US" sz="1600" b="0" kern="1200" baseline="0" dirty="0" smtClean="0">
                           <a:solidFill>
                             <a:schemeClr val="tx1">
                               <a:lumMod val="95000"/>
@@ -12253,7 +12352,21 @@
                           <a:ea typeface="+mn-ea"/>
                           <a:cs typeface="+mn-cs"/>
                         </a:rPr>
-                        <a:t>”  </a:t>
+                        <a:t>/ </a:t>
+                      </a:r>
+                      <a:r>
+                        <a:rPr lang="en-US" sz="1600" b="0" kern="1200" baseline="0" dirty="0" smtClean="0">
+                          <a:solidFill>
+                            <a:schemeClr val="tx1">
+                              <a:lumMod val="95000"/>
+                            </a:schemeClr>
+                          </a:solidFill>
+                          <a:effectLst/>
+                          <a:latin typeface="+mn-lt"/>
+                          <a:ea typeface="+mn-ea"/>
+                          <a:cs typeface="+mn-cs"/>
+                        </a:rPr>
+                        <a:t>off</a:t>
                       </a:r>
                       <a:endParaRPr lang="de-AT" sz="1600" b="0" kern="1200" dirty="0" smtClean="0">
                         <a:solidFill>
@@ -12321,7 +12434,35 @@
                           <a:ea typeface="+mn-ea"/>
                           <a:cs typeface="+mn-cs"/>
                         </a:rPr>
-                        <a:t>Alle Lampen ein/ausschalten</a:t>
+                        <a:t>Alle Lampen </a:t>
+                      </a:r>
+                      <a:r>
+                        <a:rPr lang="de-DE" sz="1600" b="0" kern="1200" dirty="0" smtClean="0">
+                          <a:solidFill>
+                            <a:schemeClr val="tx1">
+                              <a:lumMod val="95000"/>
+                            </a:schemeClr>
+                          </a:solidFill>
+                          <a:effectLst/>
+                          <a:latin typeface="+mn-lt"/>
+                          <a:ea typeface="+mn-ea"/>
+                          <a:cs typeface="+mn-cs"/>
+                        </a:rPr>
+                        <a:t>ein-/</a:t>
+                      </a:r>
+                      <a:r>
+                        <a:rPr lang="de-DE" sz="1600" b="0" kern="1200" dirty="0" smtClean="0">
+                          <a:solidFill>
+                            <a:schemeClr val="tx1">
+                              <a:lumMod val="95000"/>
+                            </a:schemeClr>
+                          </a:solidFill>
+                          <a:effectLst/>
+                          <a:latin typeface="+mn-lt"/>
+                          <a:ea typeface="+mn-ea"/>
+                          <a:cs typeface="+mn-cs"/>
+                        </a:rPr>
+                        <a:t>ausschalten</a:t>
                       </a:r>
                       <a:endParaRPr lang="de-AT" sz="1600" b="0" kern="1200" dirty="0">
                         <a:solidFill>
@@ -12407,7 +12548,35 @@
                           <a:ea typeface="+mn-ea"/>
                           <a:cs typeface="+mn-cs"/>
                         </a:rPr>
-                        <a:t>“red / green /blue ”  </a:t>
+                        <a:t>red </a:t>
+                      </a:r>
+                      <a:r>
+                        <a:rPr lang="en-US" sz="1600" b="0" kern="1200" dirty="0" smtClean="0">
+                          <a:solidFill>
+                            <a:schemeClr val="tx1">
+                              <a:lumMod val="95000"/>
+                            </a:schemeClr>
+                          </a:solidFill>
+                          <a:effectLst/>
+                          <a:latin typeface="+mn-lt"/>
+                          <a:ea typeface="+mn-ea"/>
+                          <a:cs typeface="+mn-cs"/>
+                        </a:rPr>
+                        <a:t>/ green </a:t>
+                      </a:r>
+                      <a:r>
+                        <a:rPr lang="en-US" sz="1600" b="0" kern="1200" dirty="0" smtClean="0">
+                          <a:solidFill>
+                            <a:schemeClr val="tx1">
+                              <a:lumMod val="95000"/>
+                            </a:schemeClr>
+                          </a:solidFill>
+                          <a:effectLst/>
+                          <a:latin typeface="+mn-lt"/>
+                          <a:ea typeface="+mn-ea"/>
+                          <a:cs typeface="+mn-cs"/>
+                        </a:rPr>
+                        <a:t>/ blue</a:t>
                       </a:r>
                       <a:endParaRPr lang="de-AT" sz="1600" b="0" kern="1200" dirty="0" smtClean="0">
                         <a:solidFill>
@@ -12816,7 +12985,7 @@
           <a:p>
             <a:pPr algn="ctr"/>
             <a:r>
-              <a:rPr lang="de-DE" spc="0" dirty="0" err="1">
+              <a:rPr lang="de-DE" spc="0" dirty="0" smtClean="0">
                 <a:ln w="1905"/>
                 <a:solidFill>
                   <a:schemeClr val="tx1">
@@ -12831,7 +13000,7 @@
                   </a:innerShdw>
                 </a:effectLst>
               </a:rPr>
-              <a:t>Livedemo</a:t>
+              <a:t>Live-Demo</a:t>
             </a:r>
             <a:endParaRPr lang="de-AT" spc="0" dirty="0">
               <a:ln w="1905"/>
@@ -14026,8 +14195,13 @@
             </a:r>
             <a:r>
               <a:rPr lang="de-DE" dirty="0" smtClean="0"/>
-              <a:t>-File für Speech Recognition</a:t>
-            </a:r>
+              <a:t>-File für Speech </a:t>
+            </a:r>
+            <a:r>
+              <a:rPr lang="de-DE" dirty="0" smtClean="0"/>
+              <a:t>Recognition laden:</a:t>
+            </a:r>
+            <a:endParaRPr lang="de-DE" dirty="0" smtClean="0"/>
           </a:p>
           <a:p>
             <a:pPr marL="0" indent="0">
@@ -15438,7 +15612,7 @@
           </a:p>
           <a:p>
             <a:r>
-              <a:rPr lang="de-AT" sz="1600" dirty="0">
+              <a:rPr lang="de-AT" sz="1600" dirty="0" smtClean="0">
                 <a:solidFill>
                   <a:srgbClr val="4EC9B0"/>
                 </a:solidFill>
@@ -15446,18 +15620,7 @@
                 <a:latin typeface="Consolas" panose="020B0609020204030204" pitchFamily="49" charset="0"/>
                 <a:cs typeface="Consolas" panose="020B0609020204030204" pitchFamily="49" charset="0"/>
               </a:rPr>
-              <a:t> </a:t>
-            </a:r>
-            <a:r>
-              <a:rPr lang="de-AT" sz="1600" dirty="0" smtClean="0">
-                <a:solidFill>
-                  <a:srgbClr val="4EC9B0"/>
-                </a:solidFill>
-                <a:effectLst/>
-                <a:latin typeface="Consolas" panose="020B0609020204030204" pitchFamily="49" charset="0"/>
-                <a:cs typeface="Consolas" panose="020B0609020204030204" pitchFamily="49" charset="0"/>
-              </a:rPr>
-              <a:t>                                    </a:t>
+              <a:t>                                     </a:t>
             </a:r>
             <a:r>
               <a:rPr lang="de-AT" sz="1600" dirty="0" err="1" smtClean="0">
@@ -15484,18 +15647,11 @@
               </a:rPr>
             </a:br>
             <a:r>
-              <a:rPr lang="de-AT" sz="1600" dirty="0">
-                <a:latin typeface="Consolas" panose="020B0609020204030204" pitchFamily="49" charset="0"/>
-                <a:cs typeface="Consolas" panose="020B0609020204030204" pitchFamily="49" charset="0"/>
-              </a:rPr>
-              <a:t> </a:t>
-            </a:r>
-            <a:r>
               <a:rPr lang="de-AT" sz="1600" dirty="0" smtClean="0">
                 <a:latin typeface="Consolas" panose="020B0609020204030204" pitchFamily="49" charset="0"/>
                 <a:cs typeface="Consolas" panose="020B0609020204030204" pitchFamily="49" charset="0"/>
               </a:rPr>
-              <a:t> </a:t>
+              <a:t>  </a:t>
             </a:r>
             <a:r>
               <a:rPr lang="de-AT" sz="1600" dirty="0" err="1" smtClean="0">
@@ -15633,18 +15789,11 @@
               <a:t> </a:t>
             </a:r>
             <a:r>
-              <a:rPr lang="de-AT" sz="1600" dirty="0" err="1">
-                <a:latin typeface="Consolas" panose="020B0609020204030204" pitchFamily="49" charset="0"/>
-                <a:cs typeface="Consolas" panose="020B0609020204030204" pitchFamily="49" charset="0"/>
-              </a:rPr>
-              <a:t>h</a:t>
-            </a:r>
-            <a:r>
               <a:rPr lang="de-AT" sz="1600" dirty="0" err="1" smtClean="0">
                 <a:latin typeface="Consolas" panose="020B0609020204030204" pitchFamily="49" charset="0"/>
                 <a:cs typeface="Consolas" panose="020B0609020204030204" pitchFamily="49" charset="0"/>
               </a:rPr>
-              <a:t>ueConnector</a:t>
+              <a:t>hueConnector</a:t>
             </a:r>
             <a:r>
               <a:rPr lang="de-AT" sz="1600" dirty="0" smtClean="0">
@@ -15941,7 +16090,7 @@
             </a:r>
           </a:p>
           <a:p>
-            <a:endParaRPr lang="de-DE" sz="1600" dirty="0">
+            <a:endParaRPr lang="de-DE" sz="1600" dirty="0" smtClean="0">
               <a:latin typeface="Consolas" panose="020B0609020204030204" pitchFamily="49" charset="0"/>
               <a:cs typeface="Consolas" panose="020B0609020204030204" pitchFamily="49" charset="0"/>
             </a:endParaRPr>
@@ -15963,25 +16112,39 @@
                 <a:latin typeface="Consolas" panose="020B0609020204030204" pitchFamily="49" charset="0"/>
                 <a:cs typeface="Consolas" panose="020B0609020204030204" pitchFamily="49" charset="0"/>
               </a:rPr>
-              <a:t> (elem0</a:t>
+              <a:t> (</a:t>
+            </a:r>
+            <a:r>
+              <a:rPr lang="en-US" sz="1600" dirty="0" err="1" smtClean="0">
+                <a:latin typeface="Consolas" panose="020B0609020204030204" pitchFamily="49" charset="0"/>
+                <a:cs typeface="Consolas" panose="020B0609020204030204" pitchFamily="49" charset="0"/>
+              </a:rPr>
+              <a:t>firstTerm</a:t>
+            </a:r>
+            <a:r>
+              <a:rPr lang="en-US" sz="1600" dirty="0" err="1" smtClean="0">
+                <a:solidFill>
+                  <a:srgbClr val="B4B4B4"/>
+                </a:solidFill>
+                <a:effectLst/>
+                <a:latin typeface="Consolas" panose="020B0609020204030204" pitchFamily="49" charset="0"/>
+                <a:cs typeface="Consolas" panose="020B0609020204030204" pitchFamily="49" charset="0"/>
+              </a:rPr>
+              <a:t>.</a:t>
+            </a:r>
+            <a:r>
+              <a:rPr lang="en-US" sz="1600" dirty="0" err="1" smtClean="0">
+                <a:latin typeface="Consolas" panose="020B0609020204030204" pitchFamily="49" charset="0"/>
+                <a:cs typeface="Consolas" panose="020B0609020204030204" pitchFamily="49" charset="0"/>
+              </a:rPr>
+              <a:t>Text</a:t>
             </a:r>
             <a:r>
               <a:rPr lang="en-US" sz="1600" dirty="0" smtClean="0">
-                <a:solidFill>
-                  <a:srgbClr val="B4B4B4"/>
-                </a:solidFill>
-                <a:effectLst/>
-                <a:latin typeface="Consolas" panose="020B0609020204030204" pitchFamily="49" charset="0"/>
-                <a:cs typeface="Consolas" panose="020B0609020204030204" pitchFamily="49" charset="0"/>
-              </a:rPr>
-              <a:t>.</a:t>
-            </a:r>
-            <a:r>
-              <a:rPr lang="en-US" sz="1600" dirty="0" smtClean="0">
-                <a:latin typeface="Consolas" panose="020B0609020204030204" pitchFamily="49" charset="0"/>
-                <a:cs typeface="Consolas" panose="020B0609020204030204" pitchFamily="49" charset="0"/>
-              </a:rPr>
-              <a:t>Text </a:t>
+                <a:latin typeface="Consolas" panose="020B0609020204030204" pitchFamily="49" charset="0"/>
+                <a:cs typeface="Consolas" panose="020B0609020204030204" pitchFamily="49" charset="0"/>
+              </a:rPr>
+              <a:t> </a:t>
             </a:r>
             <a:r>
               <a:rPr lang="en-US" sz="1600" dirty="0" smtClean="0">
@@ -16040,18 +16203,11 @@
               <a:t> </a:t>
             </a:r>
             <a:r>
-              <a:rPr lang="de-AT" sz="1600" dirty="0" err="1">
-                <a:latin typeface="Consolas" panose="020B0609020204030204" pitchFamily="49" charset="0"/>
-                <a:cs typeface="Consolas" panose="020B0609020204030204" pitchFamily="49" charset="0"/>
-              </a:rPr>
-              <a:t>h</a:t>
-            </a:r>
-            <a:r>
               <a:rPr lang="de-AT" sz="1600" dirty="0" err="1" smtClean="0">
                 <a:latin typeface="Consolas" panose="020B0609020204030204" pitchFamily="49" charset="0"/>
                 <a:cs typeface="Consolas" panose="020B0609020204030204" pitchFamily="49" charset="0"/>
               </a:rPr>
-              <a:t>ueConnector</a:t>
+              <a:t>hueConnector</a:t>
             </a:r>
             <a:r>
               <a:rPr lang="en-US" sz="1600" dirty="0" smtClean="0">
@@ -16112,7 +16268,7 @@
           </a:p>
           <a:p>
             <a:r>
-              <a:rPr lang="en-US" sz="1600" dirty="0">
+              <a:rPr lang="en-US" sz="1600" dirty="0" smtClean="0">
                 <a:latin typeface="Consolas" panose="020B0609020204030204" pitchFamily="49" charset="0"/>
                 <a:cs typeface="Consolas" panose="020B0609020204030204" pitchFamily="49" charset="0"/>
               </a:rPr>
@@ -16305,8 +16461,8 @@
         </p:nvSpPr>
         <p:spPr bwMode="auto">
           <a:xfrm>
-            <a:off x="830155" y="4352472"/>
-            <a:ext cx="7475758" cy="2062103"/>
+            <a:off x="830154" y="4475582"/>
+            <a:ext cx="7558269" cy="1815882"/>
           </a:xfrm>
           <a:prstGeom prst="rect">
             <a:avLst/>
@@ -16471,6 +16627,13 @@
               <a:t>recognizedGesture</a:t>
             </a:r>
             <a:r>
+              <a:rPr lang="de-DE" sz="1600" dirty="0">
+                <a:latin typeface="Consolas" panose="020B0609020204030204" pitchFamily="49" charset="0"/>
+                <a:cs typeface="Consolas" panose="020B0609020204030204" pitchFamily="49" charset="0"/>
+              </a:rPr>
+              <a:t> </a:t>
+            </a:r>
+            <a:r>
               <a:rPr kumimoji="0" lang="de-DE" sz="1600" b="0" i="0" u="none" strike="noStrike" cap="none" normalizeH="0" baseline="0" dirty="0" smtClean="0">
                 <a:ln>
                   <a:noFill/>
@@ -16482,7 +16645,21 @@
                 <a:latin typeface="Consolas" panose="020B0609020204030204" pitchFamily="49" charset="0"/>
                 <a:cs typeface="Consolas" panose="020B0609020204030204" pitchFamily="49" charset="0"/>
               </a:rPr>
-              <a:t>){</a:t>
+              <a:t>{</a:t>
+            </a:r>
+            <a:r>
+              <a:rPr kumimoji="0" lang="de-DE" sz="1600" b="0" i="0" u="none" strike="noStrike" cap="none" normalizeH="0" baseline="0" dirty="0" smtClean="0">
+                <a:ln>
+                  <a:noFill/>
+                </a:ln>
+                <a:solidFill>
+                  <a:schemeClr val="tx1"/>
+                </a:solidFill>
+                <a:effectLst/>
+                <a:latin typeface="Consolas" panose="020B0609020204030204" pitchFamily="49" charset="0"/>
+                <a:cs typeface="Consolas" panose="020B0609020204030204" pitchFamily="49" charset="0"/>
+              </a:rPr>
+              <a:t/>
             </a:r>
             <a:br>
               <a:rPr kumimoji="0" lang="de-DE" sz="1600" b="0" i="0" u="none" strike="noStrike" cap="none" normalizeH="0" baseline="0" dirty="0" smtClean="0">
@@ -16999,6 +17176,34 @@
               <a:t>case</a:t>
             </a:r>
             <a:r>
+              <a:rPr kumimoji="0" lang="de-DE" sz="1600" b="0" i="0" u="none" strike="noStrike" cap="none" normalizeH="0" baseline="0" smtClean="0">
+                <a:ln>
+                  <a:noFill/>
+                </a:ln>
+                <a:solidFill>
+                  <a:schemeClr val="tx1"/>
+                </a:solidFill>
+                <a:effectLst/>
+                <a:latin typeface="Consolas" panose="020B0609020204030204" pitchFamily="49" charset="0"/>
+                <a:cs typeface="Consolas" panose="020B0609020204030204" pitchFamily="49" charset="0"/>
+              </a:rPr>
+              <a:t> </a:t>
+            </a:r>
+            <a:r>
+              <a:rPr kumimoji="0" lang="de-DE" sz="1600" b="0" i="0" u="none" strike="noStrike" cap="none" normalizeH="0" baseline="0" smtClean="0">
+                <a:ln>
+                  <a:noFill/>
+                </a:ln>
+                <a:solidFill>
+                  <a:schemeClr val="tx1"/>
+                </a:solidFill>
+                <a:effectLst/>
+                <a:latin typeface="Consolas" panose="020B0609020204030204" pitchFamily="49" charset="0"/>
+                <a:cs typeface="Consolas" panose="020B0609020204030204" pitchFamily="49" charset="0"/>
+              </a:rPr>
+              <a:t>GESTURE_CIRCLE_CW </a:t>
+            </a:r>
+            <a:r>
               <a:rPr kumimoji="0" lang="de-DE" sz="1600" b="0" i="0" u="none" strike="noStrike" cap="none" normalizeH="0" baseline="0" dirty="0" smtClean="0">
                 <a:ln>
                   <a:noFill/>
@@ -17010,7 +17215,7 @@
                 <a:latin typeface="Consolas" panose="020B0609020204030204" pitchFamily="49" charset="0"/>
                 <a:cs typeface="Consolas" panose="020B0609020204030204" pitchFamily="49" charset="0"/>
               </a:rPr>
-              <a:t> GESTURE_GESTURE_CIRCLE_CW : {</a:t>
+              <a:t>: {</a:t>
             </a:r>
             <a:br>
               <a:rPr kumimoji="0" lang="de-DE" sz="1600" b="0" i="0" u="none" strike="noStrike" cap="none" normalizeH="0" baseline="0" dirty="0" smtClean="0">
@@ -17162,7 +17367,7 @@
         <p:spPr>
           <a:xfrm>
             <a:off x="827584" y="1988840"/>
-            <a:ext cx="7478329" cy="1569660"/>
+            <a:ext cx="7560839" cy="1569660"/>
           </a:xfrm>
           <a:prstGeom prst="rect">
             <a:avLst/>
@@ -17185,7 +17390,7 @@
           </a:effectLst>
         </p:spPr>
         <p:txBody>
-          <a:bodyPr wrap="none" rtlCol="0">
+          <a:bodyPr wrap="square" rtlCol="0">
             <a:spAutoFit/>
           </a:bodyPr>
           <a:lstStyle/>

</xml_diff>

<commit_message>
Updated slide 8 in ppt.
</commit_message>
<xml_diff>
--- a/doc/MUS2_GestureSpeechHue_Grebe_Winkler.pptx
+++ b/doc/MUS2_GestureSpeechHue_Grebe_Winkler.pptx
@@ -15542,7 +15542,17 @@
                 <a:latin typeface="Consolas" panose="020B0609020204030204" pitchFamily="49" charset="0"/>
                 <a:cs typeface="Consolas" panose="020B0609020204030204" pitchFamily="49" charset="0"/>
               </a:rPr>
-              <a:t>                              .</a:t>
+              <a:t>                              </a:t>
+            </a:r>
+            <a:r>
+              <a:rPr lang="de-AT" sz="1600" dirty="0" smtClean="0">
+                <a:solidFill>
+                  <a:srgbClr val="B4B4B4"/>
+                </a:solidFill>
+                <a:latin typeface="Consolas" panose="020B0609020204030204" pitchFamily="49" charset="0"/>
+                <a:cs typeface="Consolas" panose="020B0609020204030204" pitchFamily="49" charset="0"/>
+              </a:rPr>
+              <a:t>     .</a:t>
             </a:r>
             <a:r>
               <a:rPr lang="de-AT" sz="1600" dirty="0" err="1" smtClean="0">
@@ -15577,13 +15587,6 @@
                 <a:cs typeface="Consolas" panose="020B0609020204030204" pitchFamily="49" charset="0"/>
               </a:rPr>
               <a:t>);</a:t>
-            </a:r>
-            <a:r>
-              <a:rPr lang="de-AT" sz="1600" dirty="0" smtClean="0">
-                <a:latin typeface="Consolas" panose="020B0609020204030204" pitchFamily="49" charset="0"/>
-                <a:cs typeface="Consolas" panose="020B0609020204030204" pitchFamily="49" charset="0"/>
-              </a:rPr>
-              <a:t/>
             </a:r>
             <a:br>
               <a:rPr lang="de-AT" sz="1600" dirty="0" smtClean="0">
@@ -15726,7 +15729,37 @@
                 <a:latin typeface="Consolas" panose="020B0609020204030204" pitchFamily="49" charset="0"/>
                 <a:cs typeface="Consolas" panose="020B0609020204030204" pitchFamily="49" charset="0"/>
               </a:rPr>
-              <a:t>  </a:t>
+              <a:t> </a:t>
+            </a:r>
+            <a:r>
+              <a:rPr lang="de-AT" sz="1600" dirty="0" smtClean="0">
+                <a:solidFill>
+                  <a:srgbClr val="DCDCDC"/>
+                </a:solidFill>
+                <a:latin typeface="Consolas" panose="020B0609020204030204" pitchFamily="49" charset="0"/>
+                <a:cs typeface="Consolas" panose="020B0609020204030204" pitchFamily="49" charset="0"/>
+              </a:rPr>
+              <a:t> </a:t>
+            </a:r>
+            <a:r>
+              <a:rPr lang="de-AT" sz="1600" dirty="0" err="1" smtClean="0">
+                <a:solidFill>
+                  <a:srgbClr val="4EC9B0"/>
+                </a:solidFill>
+                <a:latin typeface="Consolas" panose="020B0609020204030204" pitchFamily="49" charset="0"/>
+                <a:cs typeface="Consolas" panose="020B0609020204030204" pitchFamily="49" charset="0"/>
+              </a:rPr>
+              <a:t>RecognizedWordUnit</a:t>
+            </a:r>
+            <a:r>
+              <a:rPr lang="de-AT" sz="1600" dirty="0" smtClean="0">
+                <a:solidFill>
+                  <a:srgbClr val="4EC9B0"/>
+                </a:solidFill>
+                <a:latin typeface="Consolas" panose="020B0609020204030204" pitchFamily="49" charset="0"/>
+                <a:cs typeface="Consolas" panose="020B0609020204030204" pitchFamily="49" charset="0"/>
+              </a:rPr>
+              <a:t> </a:t>
             </a:r>
             <a:r>
               <a:rPr lang="de-AT" sz="1600" dirty="0" err="1" smtClean="0">

</xml_diff>